<commit_message>
scriptbasic integration test pom.jam-s are fixed here and there
</commit_message>
<xml_diff>
--- a/presentations/001intro/jamal_intro.pptx
+++ b/presentations/001intro/jamal_intro.pptx
@@ -208,7 +208,7 @@
           <a:p>
             <a:fld id="{8A34C099-7BEE-E248-A70A-1C1EB43B9B00}" type="datetimeFigureOut">
               <a:rPr lang="en-US" smtClean="0"/>
-              <a:t>5/15/21</a:t>
+              <a:t>2/16/23</a:t>
             </a:fld>
             <a:endParaRPr lang="en-US"/>
           </a:p>
@@ -1394,7 +1394,7 @@
           <a:p>
             <a:fld id="{82EDB8D0-98ED-4B86-9D5F-E61ADC70144D}" type="datetimeFigureOut">
               <a:rPr lang="en-US" smtClean="0"/>
-              <a:t>5/15/21</a:t>
+              <a:t>2/16/23</a:t>
             </a:fld>
             <a:endParaRPr lang="en-US" dirty="0"/>
           </a:p>
@@ -1594,7 +1594,7 @@
           <a:p>
             <a:fld id="{82EDB8D0-98ED-4B86-9D5F-E61ADC70144D}" type="datetimeFigureOut">
               <a:rPr lang="en-US" smtClean="0"/>
-              <a:t>5/15/21</a:t>
+              <a:t>2/16/23</a:t>
             </a:fld>
             <a:endParaRPr lang="en-US"/>
           </a:p>
@@ -1804,7 +1804,7 @@
           <a:p>
             <a:fld id="{82EDB8D0-98ED-4B86-9D5F-E61ADC70144D}" type="datetimeFigureOut">
               <a:rPr lang="en-US" smtClean="0"/>
-              <a:t>5/15/21</a:t>
+              <a:t>2/16/23</a:t>
             </a:fld>
             <a:endParaRPr lang="en-US"/>
           </a:p>
@@ -2036,7 +2036,7 @@
           <a:p>
             <a:fld id="{82EDB8D0-98ED-4B86-9D5F-E61ADC70144D}" type="datetimeFigureOut">
               <a:rPr lang="en-US" smtClean="0"/>
-              <a:t>5/15/21</a:t>
+              <a:t>2/16/23</a:t>
             </a:fld>
             <a:endParaRPr lang="en-US" dirty="0"/>
           </a:p>
@@ -2312,7 +2312,7 @@
           <a:p>
             <a:fld id="{82EDB8D0-98ED-4B86-9D5F-E61ADC70144D}" type="datetimeFigureOut">
               <a:rPr lang="en-US" smtClean="0"/>
-              <a:t>5/15/21</a:t>
+              <a:t>2/16/23</a:t>
             </a:fld>
             <a:endParaRPr lang="en-US"/>
           </a:p>
@@ -2580,7 +2580,7 @@
           <a:p>
             <a:fld id="{82EDB8D0-98ED-4B86-9D5F-E61ADC70144D}" type="datetimeFigureOut">
               <a:rPr lang="en-US" smtClean="0"/>
-              <a:t>5/15/21</a:t>
+              <a:t>2/16/23</a:t>
             </a:fld>
             <a:endParaRPr lang="en-US"/>
           </a:p>
@@ -2995,7 +2995,7 @@
           <a:p>
             <a:fld id="{82EDB8D0-98ED-4B86-9D5F-E61ADC70144D}" type="datetimeFigureOut">
               <a:rPr lang="en-US" smtClean="0"/>
-              <a:t>5/15/21</a:t>
+              <a:t>2/16/23</a:t>
             </a:fld>
             <a:endParaRPr lang="en-US"/>
           </a:p>
@@ -3137,7 +3137,7 @@
           <a:p>
             <a:fld id="{82EDB8D0-98ED-4B86-9D5F-E61ADC70144D}" type="datetimeFigureOut">
               <a:rPr lang="en-US" smtClean="0"/>
-              <a:t>5/15/21</a:t>
+              <a:t>2/16/23</a:t>
             </a:fld>
             <a:endParaRPr lang="en-US"/>
           </a:p>
@@ -3250,7 +3250,7 @@
           <a:p>
             <a:fld id="{82EDB8D0-98ED-4B86-9D5F-E61ADC70144D}" type="datetimeFigureOut">
               <a:rPr lang="en-US" smtClean="0"/>
-              <a:t>5/15/21</a:t>
+              <a:t>2/16/23</a:t>
             </a:fld>
             <a:endParaRPr lang="en-US"/>
           </a:p>
@@ -3563,7 +3563,7 @@
           <a:p>
             <a:fld id="{82EDB8D0-98ED-4B86-9D5F-E61ADC70144D}" type="datetimeFigureOut">
               <a:rPr lang="en-US" smtClean="0"/>
-              <a:t>5/15/21</a:t>
+              <a:t>2/16/23</a:t>
             </a:fld>
             <a:endParaRPr lang="en-US"/>
           </a:p>
@@ -3853,7 +3853,7 @@
             <a:fld id="{82EDB8D0-98ED-4B86-9D5F-E61ADC70144D}" type="datetimeFigureOut">
               <a:rPr lang="en-US" smtClean="0"/>
               <a:pPr/>
-              <a:t>5/15/21</a:t>
+              <a:t>2/16/23</a:t>
             </a:fld>
             <a:endParaRPr lang="en-US" dirty="0"/>
           </a:p>
@@ -4157,7 +4157,7 @@
             <a:fld id="{82EDB8D0-98ED-4B86-9D5F-E61ADC70144D}" type="datetimeFigureOut">
               <a:rPr lang="en-US" smtClean="0"/>
               <a:pPr/>
-              <a:t>5/15/21</a:t>
+              <a:t>2/16/23</a:t>
             </a:fld>
             <a:endParaRPr lang="en-US" dirty="0"/>
           </a:p>
@@ -5564,7 +5564,7 @@
                   <a:srgbClr val="FECC71"/>
                 </a:solidFill>
               </a:rPr>
-              <a:t>   &lt;version&gt;1.7.6&lt;/version&gt;</a:t>
+              <a:t>   &lt;version&gt;1.12.6&lt;/version&gt;</a:t>
             </a:r>
           </a:p>
           <a:p>

</xml_diff>

<commit_message>
Ruby, Groovy, ScriptBasic and IO/exec macro now use sentinel protection Deferred errors
</commit_message>
<xml_diff>
--- a/presentations/001intro/jamal_intro.pptx
+++ b/presentations/001intro/jamal_intro.pptx
@@ -208,7 +208,7 @@
           <a:p>
             <a:fld id="{8A34C099-7BEE-E248-A70A-1C1EB43B9B00}" type="datetimeFigureOut">
               <a:rPr lang="en-US" smtClean="0"/>
-              <a:t>2/16/23</a:t>
+              <a:t>3/11/25</a:t>
             </a:fld>
             <a:endParaRPr lang="en-US"/>
           </a:p>
@@ -1394,7 +1394,7 @@
           <a:p>
             <a:fld id="{82EDB8D0-98ED-4B86-9D5F-E61ADC70144D}" type="datetimeFigureOut">
               <a:rPr lang="en-US" smtClean="0"/>
-              <a:t>2/16/23</a:t>
+              <a:t>3/11/25</a:t>
             </a:fld>
             <a:endParaRPr lang="en-US" dirty="0"/>
           </a:p>
@@ -1594,7 +1594,7 @@
           <a:p>
             <a:fld id="{82EDB8D0-98ED-4B86-9D5F-E61ADC70144D}" type="datetimeFigureOut">
               <a:rPr lang="en-US" smtClean="0"/>
-              <a:t>2/16/23</a:t>
+              <a:t>3/11/25</a:t>
             </a:fld>
             <a:endParaRPr lang="en-US"/>
           </a:p>
@@ -1804,7 +1804,7 @@
           <a:p>
             <a:fld id="{82EDB8D0-98ED-4B86-9D5F-E61ADC70144D}" type="datetimeFigureOut">
               <a:rPr lang="en-US" smtClean="0"/>
-              <a:t>2/16/23</a:t>
+              <a:t>3/11/25</a:t>
             </a:fld>
             <a:endParaRPr lang="en-US"/>
           </a:p>
@@ -2036,7 +2036,7 @@
           <a:p>
             <a:fld id="{82EDB8D0-98ED-4B86-9D5F-E61ADC70144D}" type="datetimeFigureOut">
               <a:rPr lang="en-US" smtClean="0"/>
-              <a:t>2/16/23</a:t>
+              <a:t>3/11/25</a:t>
             </a:fld>
             <a:endParaRPr lang="en-US" dirty="0"/>
           </a:p>
@@ -2312,7 +2312,7 @@
           <a:p>
             <a:fld id="{82EDB8D0-98ED-4B86-9D5F-E61ADC70144D}" type="datetimeFigureOut">
               <a:rPr lang="en-US" smtClean="0"/>
-              <a:t>2/16/23</a:t>
+              <a:t>3/11/25</a:t>
             </a:fld>
             <a:endParaRPr lang="en-US"/>
           </a:p>
@@ -2580,7 +2580,7 @@
           <a:p>
             <a:fld id="{82EDB8D0-98ED-4B86-9D5F-E61ADC70144D}" type="datetimeFigureOut">
               <a:rPr lang="en-US" smtClean="0"/>
-              <a:t>2/16/23</a:t>
+              <a:t>3/11/25</a:t>
             </a:fld>
             <a:endParaRPr lang="en-US"/>
           </a:p>
@@ -2995,7 +2995,7 @@
           <a:p>
             <a:fld id="{82EDB8D0-98ED-4B86-9D5F-E61ADC70144D}" type="datetimeFigureOut">
               <a:rPr lang="en-US" smtClean="0"/>
-              <a:t>2/16/23</a:t>
+              <a:t>3/11/25</a:t>
             </a:fld>
             <a:endParaRPr lang="en-US"/>
           </a:p>
@@ -3137,7 +3137,7 @@
           <a:p>
             <a:fld id="{82EDB8D0-98ED-4B86-9D5F-E61ADC70144D}" type="datetimeFigureOut">
               <a:rPr lang="en-US" smtClean="0"/>
-              <a:t>2/16/23</a:t>
+              <a:t>3/11/25</a:t>
             </a:fld>
             <a:endParaRPr lang="en-US"/>
           </a:p>
@@ -3250,7 +3250,7 @@
           <a:p>
             <a:fld id="{82EDB8D0-98ED-4B86-9D5F-E61ADC70144D}" type="datetimeFigureOut">
               <a:rPr lang="en-US" smtClean="0"/>
-              <a:t>2/16/23</a:t>
+              <a:t>3/11/25</a:t>
             </a:fld>
             <a:endParaRPr lang="en-US"/>
           </a:p>
@@ -3563,7 +3563,7 @@
           <a:p>
             <a:fld id="{82EDB8D0-98ED-4B86-9D5F-E61ADC70144D}" type="datetimeFigureOut">
               <a:rPr lang="en-US" smtClean="0"/>
-              <a:t>2/16/23</a:t>
+              <a:t>3/11/25</a:t>
             </a:fld>
             <a:endParaRPr lang="en-US"/>
           </a:p>
@@ -3853,7 +3853,7 @@
             <a:fld id="{82EDB8D0-98ED-4B86-9D5F-E61ADC70144D}" type="datetimeFigureOut">
               <a:rPr lang="en-US" smtClean="0"/>
               <a:pPr/>
-              <a:t>2/16/23</a:t>
+              <a:t>3/11/25</a:t>
             </a:fld>
             <a:endParaRPr lang="en-US" dirty="0"/>
           </a:p>
@@ -4157,7 +4157,7 @@
             <a:fld id="{82EDB8D0-98ED-4B86-9D5F-E61ADC70144D}" type="datetimeFigureOut">
               <a:rPr lang="en-US" smtClean="0"/>
               <a:pPr/>
-              <a:t>2/16/23</a:t>
+              <a:t>3/11/25</a:t>
             </a:fld>
             <a:endParaRPr lang="en-US" dirty="0"/>
           </a:p>
@@ -4700,7 +4700,7 @@
                 </a:solidFill>
                 <a:latin typeface="JetBrains Mono" panose="020B0509020102050004" pitchFamily="49" charset="77"/>
               </a:rPr>
-              <a:t>The Text Macro</a:t>
+              <a:t>META Markup</a:t>
             </a:r>
           </a:p>
         </p:txBody>
@@ -4740,7 +4740,7 @@
                 </a:solidFill>
                 <a:latin typeface="JetBrains Mono" panose="020B0509020102050004" pitchFamily="49" charset="77"/>
               </a:rPr>
-              <a:t>Jamal is an abbreviation: Jamal Macro Language</a:t>
+              <a:t>Jamal is an abbreviation: Jamal Markup Language</a:t>
             </a:r>
           </a:p>
         </p:txBody>
@@ -5075,65 +5075,20 @@
               <a:buNone/>
             </a:pPr>
             <a:r>
+              <a:rPr lang="en-US" dirty="0" err="1">
+                <a:solidFill>
+                  <a:srgbClr val="FECC71"/>
+                </a:solidFill>
+              </a:rPr>
+              <a:t>jamal</a:t>
+            </a:r>
+            <a:r>
               <a:rPr lang="en-US" dirty="0">
                 <a:solidFill>
                   <a:srgbClr val="FECC71"/>
                 </a:solidFill>
               </a:rPr>
-              <a:t>./</a:t>
-            </a:r>
-            <a:r>
-              <a:rPr lang="en-US" dirty="0" err="1">
-                <a:solidFill>
-                  <a:srgbClr val="FECC71"/>
-                </a:solidFill>
-              </a:rPr>
-              <a:t>jamal.sh</a:t>
-            </a:r>
-            <a:r>
-              <a:rPr lang="en-US" dirty="0">
-                <a:solidFill>
-                  <a:srgbClr val="FECC71"/>
-                </a:solidFill>
-              </a:rPr>
-              <a:t> –f input output</a:t>
-            </a:r>
-          </a:p>
-          <a:p>
-            <a:pPr marL="0" indent="0">
-              <a:buNone/>
-            </a:pPr>
-            <a:r>
-              <a:rPr lang="en-US" dirty="0" err="1">
-                <a:solidFill>
-                  <a:srgbClr val="FECC71"/>
-                </a:solidFill>
-              </a:rPr>
-              <a:t>jbang</a:t>
-            </a:r>
-            <a:r>
-              <a:rPr lang="en-US" dirty="0">
-                <a:solidFill>
-                  <a:srgbClr val="FECC71"/>
-                </a:solidFill>
-              </a:rPr>
-              <a:t> </a:t>
-            </a:r>
-            <a:r>
-              <a:rPr lang="en-US" dirty="0" err="1">
-                <a:solidFill>
-                  <a:srgbClr val="FECC71"/>
-                </a:solidFill>
-              </a:rPr>
-              <a:t>jamal@verhas</a:t>
-            </a:r>
-            <a:r>
-              <a:rPr lang="en-US" dirty="0">
-                <a:solidFill>
-                  <a:srgbClr val="FECC71"/>
-                </a:solidFill>
-              </a:rPr>
-              <a:t> –f input output</a:t>
+              <a:t> input output</a:t>
             </a:r>
           </a:p>
           <a:p>
@@ -5172,8 +5127,21 @@
                   <a:srgbClr val="FECC71"/>
                 </a:solidFill>
               </a:rPr>
-              <a:t> DOCLET</a:t>
-            </a:r>
+              <a:t> DOCLET, WYISWYG plugin in IntelliJ, </a:t>
+            </a:r>
+            <a:r>
+              <a:rPr lang="en-US" dirty="0" err="1">
+                <a:solidFill>
+                  <a:srgbClr val="FECC71"/>
+                </a:solidFill>
+              </a:rPr>
+              <a:t>AsciidocFX</a:t>
+            </a:r>
+            <a:endParaRPr lang="en-US" dirty="0">
+              <a:solidFill>
+                <a:srgbClr val="FECC71"/>
+              </a:solidFill>
+            </a:endParaRPr>
           </a:p>
         </p:txBody>
       </p:sp>
@@ -5272,56 +5240,7 @@
                                         <p:tgtEl>
                                           <p:spTgt spid="3">
                                             <p:txEl>
-                                              <p:pRg st="1" end="1"/>
-                                            </p:txEl>
-                                          </p:spTgt>
-                                        </p:tgtEl>
-                                        <p:attrNameLst>
-                                          <p:attrName>style.visibility</p:attrName>
-                                        </p:attrNameLst>
-                                      </p:cBhvr>
-                                      <p:to>
-                                        <p:strVal val="visible"/>
-                                      </p:to>
-                                    </p:set>
-                                  </p:childTnLst>
-                                </p:cTn>
-                              </p:par>
-                            </p:childTnLst>
-                          </p:cTn>
-                        </p:par>
-                      </p:childTnLst>
-                    </p:cTn>
-                  </p:par>
-                  <p:par>
-                    <p:cTn id="11" fill="hold">
-                      <p:stCondLst>
-                        <p:cond delay="indefinite"/>
-                      </p:stCondLst>
-                      <p:childTnLst>
-                        <p:par>
-                          <p:cTn id="12" fill="hold">
-                            <p:stCondLst>
-                              <p:cond delay="0"/>
-                            </p:stCondLst>
-                            <p:childTnLst>
-                              <p:par>
-                                <p:cTn id="13" presetID="1" presetClass="entr" presetSubtype="0" fill="hold" grpId="0" nodeType="clickEffect">
-                                  <p:stCondLst>
-                                    <p:cond delay="0"/>
-                                  </p:stCondLst>
-                                  <p:childTnLst>
-                                    <p:set>
-                                      <p:cBhvr>
-                                        <p:cTn id="14" dur="1" fill="hold">
-                                          <p:stCondLst>
-                                            <p:cond delay="0"/>
-                                          </p:stCondLst>
-                                        </p:cTn>
-                                        <p:tgtEl>
-                                          <p:spTgt spid="3">
-                                            <p:txEl>
-                                              <p:pRg st="3" end="3"/>
+                                              <p:pRg st="2" end="2"/>
                                             </p:txEl>
                                           </p:spTgt>
                                         </p:tgtEl>
@@ -5535,7 +5454,7 @@
                   <a:srgbClr val="FECC71"/>
                 </a:solidFill>
               </a:rPr>
-              <a:t>-engine&lt;/</a:t>
+              <a:t>-all&lt;/</a:t>
             </a:r>
             <a:r>
               <a:rPr lang="en-US" dirty="0" err="1">
@@ -5564,7 +5483,7 @@
                   <a:srgbClr val="FECC71"/>
                 </a:solidFill>
               </a:rPr>
-              <a:t>   &lt;version&gt;1.12.6&lt;/version&gt;</a:t>
+              <a:t>   &lt;version&gt;2.8.3&lt;/version&gt;</a:t>
             </a:r>
           </a:p>
           <a:p>
@@ -5945,7 +5864,7 @@
                   <a:srgbClr val="FECC71"/>
                 </a:solidFill>
               </a:rPr>
-              <a:t>Ruby, Groovy, BASIC, </a:t>
+              <a:t>Ruby, Groovy, BASIC, Python, </a:t>
             </a:r>
             <a:r>
               <a:rPr lang="en-US" dirty="0" err="1">
@@ -5971,23 +5890,7 @@
                   <a:srgbClr val="FECC71"/>
                 </a:solidFill>
               </a:rPr>
-              <a:t>Embed </a:t>
-            </a:r>
-            <a:r>
-              <a:rPr lang="en-US" dirty="0" err="1">
-                <a:solidFill>
-                  <a:srgbClr val="FECC71"/>
-                </a:solidFill>
-              </a:rPr>
-              <a:t>PlantUML</a:t>
-            </a:r>
-            <a:r>
-              <a:rPr lang="en-US" dirty="0">
-                <a:solidFill>
-                  <a:srgbClr val="FECC71"/>
-                </a:solidFill>
-              </a:rPr>
-              <a:t> diagrams</a:t>
+              <a:t>Embed diagrams</a:t>
             </a:r>
           </a:p>
           <a:p>
@@ -6055,7 +5958,7 @@
                   <a:srgbClr val="FECC71"/>
                 </a:solidFill>
               </a:rPr>
-              <a:t>Collects snippets and extract data from </a:t>
+              <a:t>Collects snippets and extracts data from </a:t>
             </a:r>
             <a:r>
               <a:rPr lang="en-US" dirty="0" err="1">
@@ -6071,7 +5974,7 @@
                   <a:srgbClr val="FECC71"/>
                 </a:solidFill>
               </a:rPr>
-              <a:t>, XML, text files and insert into the output after transformation</a:t>
+              <a:t>, XML, and text files and inserts it into the output after transformation</a:t>
             </a:r>
           </a:p>
           <a:p>
@@ -6081,7 +5984,7 @@
                   <a:srgbClr val="FECC71"/>
                 </a:solidFill>
               </a:rPr>
-              <a:t>support XML and </a:t>
+              <a:t>support XML, JSON, and </a:t>
             </a:r>
             <a:r>
               <a:rPr lang="en-US" dirty="0" err="1">
@@ -6097,7 +6000,17 @@
                   <a:srgbClr val="FECC71"/>
                 </a:solidFill>
               </a:rPr>
-              <a:t> formatted output</a:t>
+              <a:t>-formatted output</a:t>
+            </a:r>
+          </a:p>
+          <a:p>
+            <a:r>
+              <a:rPr lang="en-US" dirty="0">
+                <a:solidFill>
+                  <a:srgbClr val="FECC71"/>
+                </a:solidFill>
+              </a:rPr>
+              <a:t>SQL, AI API integration</a:t>
             </a:r>
           </a:p>
         </p:txBody>
@@ -6365,6 +6278,55 @@
                       </p:childTnLst>
                     </p:cTn>
                   </p:par>
+                  <p:par>
+                    <p:cTn id="23" fill="hold">
+                      <p:stCondLst>
+                        <p:cond delay="indefinite"/>
+                      </p:stCondLst>
+                      <p:childTnLst>
+                        <p:par>
+                          <p:cTn id="24" fill="hold">
+                            <p:stCondLst>
+                              <p:cond delay="0"/>
+                            </p:stCondLst>
+                            <p:childTnLst>
+                              <p:par>
+                                <p:cTn id="25" presetID="1" presetClass="entr" presetSubtype="0" fill="hold" grpId="0" nodeType="clickEffect">
+                                  <p:stCondLst>
+                                    <p:cond delay="0"/>
+                                  </p:stCondLst>
+                                  <p:childTnLst>
+                                    <p:set>
+                                      <p:cBhvr>
+                                        <p:cTn id="26" dur="1" fill="hold">
+                                          <p:stCondLst>
+                                            <p:cond delay="0"/>
+                                          </p:stCondLst>
+                                        </p:cTn>
+                                        <p:tgtEl>
+                                          <p:spTgt spid="3">
+                                            <p:txEl>
+                                              <p:pRg st="5" end="5"/>
+                                            </p:txEl>
+                                          </p:spTgt>
+                                        </p:tgtEl>
+                                        <p:attrNameLst>
+                                          <p:attrName>style.visibility</p:attrName>
+                                        </p:attrNameLst>
+                                      </p:cBhvr>
+                                      <p:to>
+                                        <p:strVal val="visible"/>
+                                      </p:to>
+                                    </p:set>
+                                  </p:childTnLst>
+                                </p:cTn>
+                              </p:par>
+                            </p:childTnLst>
+                          </p:cTn>
+                        </p:par>
+                      </p:childTnLst>
+                    </p:cTn>
+                  </p:par>
                 </p:childTnLst>
               </p:cTn>
               <p:prevCondLst>
@@ -7177,7 +7139,7 @@
                   <a:srgbClr val="FECC71"/>
                 </a:solidFill>
               </a:rPr>
-              <a:t>traced in XML trace file and also</a:t>
+              <a:t>traced in the XML trace file and also</a:t>
             </a:r>
           </a:p>
           <a:p>
@@ -7187,7 +7149,7 @@
                   <a:srgbClr val="FECC71"/>
                 </a:solidFill>
               </a:rPr>
-              <a:t>Debugged using web based graphical debugger</a:t>
+              <a:t>Debugged using React-based graphical debugger</a:t>
             </a:r>
           </a:p>
         </p:txBody>
@@ -7487,7 +7449,7 @@
               <a:rPr lang="en-US" dirty="0">
                 <a:latin typeface="JetBrains Mono" panose="020B0509020102050004" pitchFamily="49" charset="77"/>
               </a:rPr>
-              <a:t>macro language</a:t>
+              <a:t>meta-markup language</a:t>
             </a:r>
           </a:p>
           <a:p>

</xml_diff>